<commit_message>
Added a few slides to set up intro to TFE
</commit_message>
<xml_diff>
--- a/Slides/Azure and Terraform Workshop - Chapter 1.pptx
+++ b/Slides/Azure and Terraform Workshop - Chapter 1.pptx
@@ -396,7 +396,7 @@
           <a:p>
             <a:fld id="{15E32702-A582-D646-948A-1015FA014A09}" type="datetimeFigureOut">
               <a:rPr lang="en-US" smtClean="0"/>
-              <a:t>4/26/2018</a:t>
+              <a:t>9/9/2018</a:t>
             </a:fld>
             <a:endParaRPr lang="en-US"/>
           </a:p>
@@ -1733,7 +1733,7 @@
           <a:p>
             <a:r>
               <a:rPr lang="en-US" dirty="0"/>
-              <a:t>Have your participants introduce themselves.</a:t>
+              <a:t>Have your participants introduce themselves.  The favorite text editor is a good ice breaker and it also provides you with valuable information about your students experience level.  If anyone says "Notepad" or "Um…I don't know" it means they don't write code that often (if at all).  Try and seat these people next to someone who answers with vim, emacs, Visual Studio Code, etc.</a:t>
             </a:r>
           </a:p>
         </p:txBody>
@@ -2597,7 +2597,11 @@
           <a:p>
             <a:r>
               <a:rPr lang="en-US" dirty="0"/>
-              <a:t>Make sure and download the 64 bit version for Windows.  Terraform is shipped as a single binary, inside of a zip archive.</a:t>
+              <a:t>Make sure and download the 64 bit version for Windows</a:t>
+            </a:r>
+            <a:r>
+              <a:rPr lang="en-US"/>
+              <a:t>.  </a:t>
             </a:r>
             <a:endParaRPr dirty="0"/>
           </a:p>
@@ -5592,6 +5596,21 @@
               <a:rPr lang="en-US" dirty="0"/>
               <a:t>Here we are in the Azure portal…you simply select Virtual Machines, then search for the type of VM you want to create.  It’s easy!  But it doesn’t scale well.   Building VMs by hand is not recommended except for dev and experimentation.</a:t>
             </a:r>
+          </a:p>
+          <a:p>
+            <a:endParaRPr lang="en-US" dirty="0"/>
+          </a:p>
+          <a:p>
+            <a:r>
+              <a:rPr lang="en-US" dirty="0"/>
+              <a:t>Also note that there are several other parts to creating that single VM that are hidden away from the end user by the GUI.  You need a resource group, virtual network, subnet, security group, network interface, storage, and a public IP address before you can set up your VM.  The "simple" GUI can build these things for you, but it doesn't scale that well, and is certainly not designed for automation.</a:t>
+            </a:r>
+          </a:p>
+          <a:p>
+            <a:endParaRPr lang="en-US" dirty="0"/>
+          </a:p>
+          <a:p>
+            <a:endParaRPr lang="en-US" dirty="0"/>
           </a:p>
         </p:txBody>
       </p:sp>
@@ -5855,7 +5874,7 @@
           <a:p>
             <a:fld id="{EE2D613C-C0FF-5D4D-9461-34EBB5775A81}" type="datetimeFigureOut">
               <a:rPr lang="en-US" smtClean="0"/>
-              <a:t>4/26/2018</a:t>
+              <a:t>9/9/2018</a:t>
             </a:fld>
             <a:endParaRPr lang="en-US"/>
           </a:p>
@@ -6023,7 +6042,7 @@
           <a:p>
             <a:fld id="{EE2D613C-C0FF-5D4D-9461-34EBB5775A81}" type="datetimeFigureOut">
               <a:rPr lang="en-US" smtClean="0"/>
-              <a:t>4/26/2018</a:t>
+              <a:t>9/9/2018</a:t>
             </a:fld>
             <a:endParaRPr lang="en-US"/>
           </a:p>
@@ -6201,7 +6220,7 @@
           <a:p>
             <a:fld id="{EE2D613C-C0FF-5D4D-9461-34EBB5775A81}" type="datetimeFigureOut">
               <a:rPr lang="en-US" smtClean="0"/>
-              <a:t>4/26/2018</a:t>
+              <a:t>9/9/2018</a:t>
             </a:fld>
             <a:endParaRPr lang="en-US"/>
           </a:p>
@@ -6383,7 +6402,7 @@
             <a:effectLst/>
             <a:extLst>
               <a:ext uri="{C572A759-6A51-4108-AA02-DFA0A04FC94B}">
-                <ma14:wrappingTextBoxFlag xmlns:ma14="http://schemas.microsoft.com/office/mac/drawingml/2011/main" xmlns="" val="1"/>
+                <ma14:wrappingTextBoxFlag xmlns="" xmlns:ma14="http://schemas.microsoft.com/office/mac/drawingml/2011/main" val="1"/>
               </a:ext>
             </a:extLst>
           </p:spPr>
@@ -7950,7 +7969,7 @@
           <a:p>
             <a:fld id="{EE2D613C-C0FF-5D4D-9461-34EBB5775A81}" type="datetimeFigureOut">
               <a:rPr lang="en-US" smtClean="0"/>
-              <a:t>4/26/2018</a:t>
+              <a:t>9/9/2018</a:t>
             </a:fld>
             <a:endParaRPr lang="en-US"/>
           </a:p>
@@ -8299,7 +8318,7 @@
           </a:ln>
           <a:extLst>
             <a:ext uri="{C572A759-6A51-4108-AA02-DFA0A04FC94B}">
-              <ma14:wrappingTextBoxFlag xmlns:ma14="http://schemas.microsoft.com/office/mac/drawingml/2011/main" xmlns="" val="1"/>
+              <ma14:wrappingTextBoxFlag xmlns="" xmlns:ma14="http://schemas.microsoft.com/office/mac/drawingml/2011/main" val="1"/>
             </a:ext>
           </a:extLst>
         </p:spPr>
@@ -8516,7 +8535,7 @@
             <a:effectLst/>
             <a:extLst>
               <a:ext uri="{C572A759-6A51-4108-AA02-DFA0A04FC94B}">
-                <ma14:wrappingTextBoxFlag xmlns:ma14="http://schemas.microsoft.com/office/mac/drawingml/2011/main" xmlns="" val="1"/>
+                <ma14:wrappingTextBoxFlag xmlns="" xmlns:ma14="http://schemas.microsoft.com/office/mac/drawingml/2011/main" val="1"/>
               </a:ext>
             </a:extLst>
           </p:spPr>
@@ -10311,7 +10330,7 @@
           </a:ln>
           <a:extLst>
             <a:ext uri="{C572A759-6A51-4108-AA02-DFA0A04FC94B}">
-              <ma14:wrappingTextBoxFlag xmlns:ma14="http://schemas.microsoft.com/office/mac/drawingml/2011/main" xmlns="" val="1"/>
+              <ma14:wrappingTextBoxFlag xmlns="" xmlns:ma14="http://schemas.microsoft.com/office/mac/drawingml/2011/main" val="1"/>
             </a:ext>
           </a:extLst>
         </p:spPr>
@@ -10593,7 +10612,7 @@
           <a:p>
             <a:fld id="{EE2D613C-C0FF-5D4D-9461-34EBB5775A81}" type="datetimeFigureOut">
               <a:rPr lang="en-US" smtClean="0"/>
-              <a:t>4/26/2018</a:t>
+              <a:t>9/9/2018</a:t>
             </a:fld>
             <a:endParaRPr lang="en-US"/>
           </a:p>
@@ -10822,7 +10841,7 @@
           <a:p>
             <a:fld id="{EE2D613C-C0FF-5D4D-9461-34EBB5775A81}" type="datetimeFigureOut">
               <a:rPr lang="en-US" smtClean="0"/>
-              <a:t>4/26/2018</a:t>
+              <a:t>9/9/2018</a:t>
             </a:fld>
             <a:endParaRPr lang="en-US"/>
           </a:p>
@@ -11186,7 +11205,7 @@
           <a:p>
             <a:fld id="{EE2D613C-C0FF-5D4D-9461-34EBB5775A81}" type="datetimeFigureOut">
               <a:rPr lang="en-US" smtClean="0"/>
-              <a:t>4/26/2018</a:t>
+              <a:t>9/9/2018</a:t>
             </a:fld>
             <a:endParaRPr lang="en-US"/>
           </a:p>
@@ -11303,7 +11322,7 @@
           <a:p>
             <a:fld id="{EE2D613C-C0FF-5D4D-9461-34EBB5775A81}" type="datetimeFigureOut">
               <a:rPr lang="en-US" smtClean="0"/>
-              <a:t>4/26/2018</a:t>
+              <a:t>9/9/2018</a:t>
             </a:fld>
             <a:endParaRPr lang="en-US"/>
           </a:p>
@@ -11398,7 +11417,7 @@
           <a:p>
             <a:fld id="{EE2D613C-C0FF-5D4D-9461-34EBB5775A81}" type="datetimeFigureOut">
               <a:rPr lang="en-US" smtClean="0"/>
-              <a:t>4/26/2018</a:t>
+              <a:t>9/9/2018</a:t>
             </a:fld>
             <a:endParaRPr lang="en-US"/>
           </a:p>
@@ -11673,7 +11692,7 @@
           <a:p>
             <a:fld id="{EE2D613C-C0FF-5D4D-9461-34EBB5775A81}" type="datetimeFigureOut">
               <a:rPr lang="en-US" smtClean="0"/>
-              <a:t>4/26/2018</a:t>
+              <a:t>9/9/2018</a:t>
             </a:fld>
             <a:endParaRPr lang="en-US"/>
           </a:p>
@@ -11925,7 +11944,7 @@
           <a:p>
             <a:fld id="{EE2D613C-C0FF-5D4D-9461-34EBB5775A81}" type="datetimeFigureOut">
               <a:rPr lang="en-US" smtClean="0"/>
-              <a:t>4/26/2018</a:t>
+              <a:t>9/9/2018</a:t>
             </a:fld>
             <a:endParaRPr lang="en-US"/>
           </a:p>
@@ -12136,7 +12155,7 @@
           <a:p>
             <a:fld id="{EE2D613C-C0FF-5D4D-9461-34EBB5775A81}" type="datetimeFigureOut">
               <a:rPr lang="en-US" smtClean="0"/>
-              <a:t>4/26/2018</a:t>
+              <a:t>9/9/2018</a:t>
             </a:fld>
             <a:endParaRPr lang="en-US"/>
           </a:p>
@@ -12601,7 +12620,7 @@
           </a:ln>
           <a:extLst>
             <a:ext uri="{C572A759-6A51-4108-AA02-DFA0A04FC94B}">
-              <ma14:wrappingTextBoxFlag xmlns:ma14="http://schemas.microsoft.com/office/mac/drawingml/2011/main" xmlns="" val="1"/>
+              <ma14:wrappingTextBoxFlag xmlns="" xmlns:ma14="http://schemas.microsoft.com/office/mac/drawingml/2011/main" val="1"/>
             </a:ext>
           </a:extLst>
         </p:spPr>
@@ -12640,7 +12659,7 @@
           </a:ln>
           <a:extLst>
             <a:ext uri="{C572A759-6A51-4108-AA02-DFA0A04FC94B}">
-              <ma14:wrappingTextBoxFlag xmlns:ma14="http://schemas.microsoft.com/office/mac/drawingml/2011/main" xmlns="" val="1"/>
+              <ma14:wrappingTextBoxFlag xmlns="" xmlns:ma14="http://schemas.microsoft.com/office/mac/drawingml/2011/main" val="1"/>
             </a:ext>
           </a:extLst>
         </p:spPr>
@@ -13621,7 +13640,7 @@
           </a:ln>
           <a:extLst>
             <a:ext uri="{C572A759-6A51-4108-AA02-DFA0A04FC94B}">
-              <ma14:wrappingTextBoxFlag xmlns:ma14="http://schemas.microsoft.com/office/mac/drawingml/2011/main" xmlns="" val="1"/>
+              <ma14:wrappingTextBoxFlag xmlns="" xmlns:ma14="http://schemas.microsoft.com/office/mac/drawingml/2011/main" val="1"/>
             </a:ext>
           </a:extLst>
         </p:spPr>
@@ -13660,7 +13679,7 @@
           </a:ln>
           <a:extLst>
             <a:ext uri="{C572A759-6A51-4108-AA02-DFA0A04FC94B}">
-              <ma14:wrappingTextBoxFlag xmlns:ma14="http://schemas.microsoft.com/office/mac/drawingml/2011/main" xmlns="" val="1"/>
+              <ma14:wrappingTextBoxFlag xmlns="" xmlns:ma14="http://schemas.microsoft.com/office/mac/drawingml/2011/main" val="1"/>
             </a:ext>
           </a:extLst>
         </p:spPr>
@@ -15172,7 +15191,7 @@
           </a:prstGeom>
           <a:extLst>
             <a:ext uri="{C572A759-6A51-4108-AA02-DFA0A04FC94B}">
-              <ma14:wrappingTextBoxFlag xmlns:ma14="http://schemas.microsoft.com/office/mac/drawingml/2011/main" xmlns="" val="1"/>
+              <ma14:wrappingTextBoxFlag xmlns="" xmlns:ma14="http://schemas.microsoft.com/office/mac/drawingml/2011/main" val="1"/>
             </a:ext>
           </a:extLst>
         </p:spPr>
@@ -15468,7 +15487,7 @@
           </a:prstGeom>
           <a:extLst>
             <a:ext uri="{C572A759-6A51-4108-AA02-DFA0A04FC94B}">
-              <ma14:wrappingTextBoxFlag xmlns:ma14="http://schemas.microsoft.com/office/mac/drawingml/2011/main" xmlns="" val="1"/>
+              <ma14:wrappingTextBoxFlag xmlns="" xmlns:ma14="http://schemas.microsoft.com/office/mac/drawingml/2011/main" val="1"/>
             </a:ext>
           </a:extLst>
         </p:spPr>
@@ -16367,7 +16386,7 @@
           </a:prstGeom>
           <a:extLst>
             <a:ext uri="{C572A759-6A51-4108-AA02-DFA0A04FC94B}">
-              <ma14:wrappingTextBoxFlag xmlns:ma14="http://schemas.microsoft.com/office/mac/drawingml/2011/main" xmlns="" val="1"/>
+              <ma14:wrappingTextBoxFlag xmlns="" xmlns:ma14="http://schemas.microsoft.com/office/mac/drawingml/2011/main" val="1"/>
             </a:ext>
           </a:extLst>
         </p:spPr>
@@ -16663,7 +16682,7 @@
           </a:prstGeom>
           <a:extLst>
             <a:ext uri="{C572A759-6A51-4108-AA02-DFA0A04FC94B}">
-              <ma14:wrappingTextBoxFlag xmlns:ma14="http://schemas.microsoft.com/office/mac/drawingml/2011/main" xmlns="" val="1"/>
+              <ma14:wrappingTextBoxFlag xmlns="" xmlns:ma14="http://schemas.microsoft.com/office/mac/drawingml/2011/main" val="1"/>
             </a:ext>
           </a:extLst>
         </p:spPr>
@@ -18322,8 +18341,8 @@
         </p:nvSpPr>
         <p:spPr>
           <a:xfrm>
-            <a:off x="3421751" y="708009"/>
-            <a:ext cx="4159793" cy="2410916"/>
+            <a:off x="3421751" y="323288"/>
+            <a:ext cx="5222584" cy="3180358"/>
           </a:xfrm>
           <a:prstGeom prst="rect">
             <a:avLst/>
@@ -18362,9 +18381,10 @@
               </a:defRPr>
             </a:pPr>
             <a:r>
-              <a:rPr dirty="0"/>
+              <a:rPr lang="en-US" dirty="0"/>
               <a:t>Your Role</a:t>
             </a:r>
+            <a:endParaRPr dirty="0"/>
           </a:p>
           <a:p>
             <a:pPr algn="l">
@@ -18382,6 +18402,25 @@
               <a:rPr dirty="0"/>
               <a:t>Interesting Fact</a:t>
             </a:r>
+            <a:endParaRPr lang="en-US" dirty="0"/>
+          </a:p>
+          <a:p>
+            <a:pPr algn="l">
+              <a:defRPr sz="5000">
+                <a:solidFill>
+                  <a:srgbClr val="FFFFFF"/>
+                </a:solidFill>
+                <a:latin typeface="Klavika Basic"/>
+                <a:ea typeface="Klavika Basic"/>
+                <a:cs typeface="Klavika Basic"/>
+                <a:sym typeface="Klavika Basic"/>
+              </a:defRPr>
+            </a:pPr>
+            <a:r>
+              <a:rPr lang="en-US" dirty="0"/>
+              <a:t>Favorite Text Editor</a:t>
+            </a:r>
+            <a:endParaRPr dirty="0"/>
           </a:p>
         </p:txBody>
       </p:sp>
@@ -18785,7 +18824,7 @@
           </a:prstGeom>
           <a:extLst>
             <a:ext uri="{C572A759-6A51-4108-AA02-DFA0A04FC94B}">
-              <ma14:wrappingTextBoxFlag xmlns:ma14="http://schemas.microsoft.com/office/mac/drawingml/2011/main" xmlns="" val="1"/>
+              <ma14:wrappingTextBoxFlag xmlns="" xmlns:ma14="http://schemas.microsoft.com/office/mac/drawingml/2011/main" val="1"/>
             </a:ext>
           </a:extLst>
         </p:spPr>
@@ -18852,7 +18891,7 @@
           </a:prstGeom>
           <a:extLst>
             <a:ext uri="{C572A759-6A51-4108-AA02-DFA0A04FC94B}">
-              <ma14:wrappingTextBoxFlag xmlns:ma14="http://schemas.microsoft.com/office/mac/drawingml/2011/main" xmlns="" val="1"/>
+              <ma14:wrappingTextBoxFlag xmlns="" xmlns:ma14="http://schemas.microsoft.com/office/mac/drawingml/2011/main" val="1"/>
             </a:ext>
           </a:extLst>
         </p:spPr>
@@ -18931,7 +18970,7 @@
           </a:prstGeom>
           <a:extLst>
             <a:ext uri="{C572A759-6A51-4108-AA02-DFA0A04FC94B}">
-              <ma14:wrappingTextBoxFlag xmlns:ma14="http://schemas.microsoft.com/office/mac/drawingml/2011/main" xmlns="" val="1"/>
+              <ma14:wrappingTextBoxFlag xmlns="" xmlns:ma14="http://schemas.microsoft.com/office/mac/drawingml/2011/main" val="1"/>
             </a:ext>
           </a:extLst>
         </p:spPr>
@@ -19022,7 +19061,7 @@
           </a:prstGeom>
           <a:extLst>
             <a:ext uri="{C572A759-6A51-4108-AA02-DFA0A04FC94B}">
-              <ma14:wrappingTextBoxFlag xmlns:ma14="http://schemas.microsoft.com/office/mac/drawingml/2011/main" xmlns="" val="1"/>
+              <ma14:wrappingTextBoxFlag xmlns="" xmlns:ma14="http://schemas.microsoft.com/office/mac/drawingml/2011/main" val="1"/>
             </a:ext>
           </a:extLst>
         </p:spPr>
@@ -19535,7 +19574,7 @@
           </a:prstGeom>
           <a:extLst>
             <a:ext uri="{C572A759-6A51-4108-AA02-DFA0A04FC94B}">
-              <ma14:wrappingTextBoxFlag xmlns:ma14="http://schemas.microsoft.com/office/mac/drawingml/2011/main" xmlns="" val="1"/>
+              <ma14:wrappingTextBoxFlag xmlns="" xmlns:ma14="http://schemas.microsoft.com/office/mac/drawingml/2011/main" val="1"/>
             </a:ext>
           </a:extLst>
         </p:spPr>
@@ -19584,7 +19623,7 @@
           </a:prstGeom>
           <a:extLst>
             <a:ext uri="{C572A759-6A51-4108-AA02-DFA0A04FC94B}">
-              <ma14:wrappingTextBoxFlag xmlns:ma14="http://schemas.microsoft.com/office/mac/drawingml/2011/main" xmlns="" val="1"/>
+              <ma14:wrappingTextBoxFlag xmlns="" xmlns:ma14="http://schemas.microsoft.com/office/mac/drawingml/2011/main" val="1"/>
             </a:ext>
           </a:extLst>
         </p:spPr>
@@ -21371,7 +21410,7 @@
           </a:prstGeom>
           <a:extLst>
             <a:ext uri="{C572A759-6A51-4108-AA02-DFA0A04FC94B}">
-              <ma14:wrappingTextBoxFlag xmlns:ma14="http://schemas.microsoft.com/office/mac/drawingml/2011/main" xmlns="" val="1"/>
+              <ma14:wrappingTextBoxFlag xmlns="" xmlns:ma14="http://schemas.microsoft.com/office/mac/drawingml/2011/main" val="1"/>
             </a:ext>
           </a:extLst>
         </p:spPr>
@@ -21600,7 +21639,7 @@
           </a:prstGeom>
           <a:extLst>
             <a:ext uri="{C572A759-6A51-4108-AA02-DFA0A04FC94B}">
-              <ma14:wrappingTextBoxFlag xmlns:ma14="http://schemas.microsoft.com/office/mac/drawingml/2011/main" xmlns="" val="1"/>
+              <ma14:wrappingTextBoxFlag xmlns="" xmlns:ma14="http://schemas.microsoft.com/office/mac/drawingml/2011/main" val="1"/>
             </a:ext>
           </a:extLst>
         </p:spPr>
@@ -22018,7 +22057,7 @@
           </a:prstGeom>
           <a:extLst>
             <a:ext uri="{C572A759-6A51-4108-AA02-DFA0A04FC94B}">
-              <ma14:wrappingTextBoxFlag xmlns:ma14="http://schemas.microsoft.com/office/mac/drawingml/2011/main" xmlns="" val="1"/>
+              <ma14:wrappingTextBoxFlag xmlns="" xmlns:ma14="http://schemas.microsoft.com/office/mac/drawingml/2011/main" val="1"/>
             </a:ext>
           </a:extLst>
         </p:spPr>
@@ -22696,7 +22735,7 @@
           </a:prstGeom>
           <a:extLst>
             <a:ext uri="{C572A759-6A51-4108-AA02-DFA0A04FC94B}">
-              <ma14:wrappingTextBoxFlag xmlns:ma14="http://schemas.microsoft.com/office/mac/drawingml/2011/main" xmlns="" val="1"/>
+              <ma14:wrappingTextBoxFlag xmlns="" xmlns:ma14="http://schemas.microsoft.com/office/mac/drawingml/2011/main" val="1"/>
             </a:ext>
           </a:extLst>
         </p:spPr>
@@ -23120,7 +23159,7 @@
           </a:prstGeom>
           <a:extLst>
             <a:ext uri="{C572A759-6A51-4108-AA02-DFA0A04FC94B}">
-              <ma14:wrappingTextBoxFlag xmlns:ma14="http://schemas.microsoft.com/office/mac/drawingml/2011/main" xmlns="" val="1"/>
+              <ma14:wrappingTextBoxFlag xmlns="" xmlns:ma14="http://schemas.microsoft.com/office/mac/drawingml/2011/main" val="1"/>
             </a:ext>
           </a:extLst>
         </p:spPr>
@@ -23988,7 +24027,7 @@
           </a:prstGeom>
           <a:extLst>
             <a:ext uri="{C572A759-6A51-4108-AA02-DFA0A04FC94B}">
-              <ma14:wrappingTextBoxFlag xmlns:ma14="http://schemas.microsoft.com/office/mac/drawingml/2011/main" xmlns="" val="1"/>
+              <ma14:wrappingTextBoxFlag xmlns="" xmlns:ma14="http://schemas.microsoft.com/office/mac/drawingml/2011/main" val="1"/>
             </a:ext>
           </a:extLst>
         </p:spPr>
@@ -24435,7 +24474,7 @@
           </a:prstGeom>
           <a:extLst>
             <a:ext uri="{C572A759-6A51-4108-AA02-DFA0A04FC94B}">
-              <ma14:wrappingTextBoxFlag xmlns:ma14="http://schemas.microsoft.com/office/mac/drawingml/2011/main" xmlns="" val="1"/>
+              <ma14:wrappingTextBoxFlag xmlns="" xmlns:ma14="http://schemas.microsoft.com/office/mac/drawingml/2011/main" val="1"/>
             </a:ext>
           </a:extLst>
         </p:spPr>
@@ -25046,7 +25085,7 @@
           </a:prstGeom>
           <a:extLst>
             <a:ext uri="{C572A759-6A51-4108-AA02-DFA0A04FC94B}">
-              <ma14:wrappingTextBoxFlag xmlns:ma14="http://schemas.microsoft.com/office/mac/drawingml/2011/main" xmlns="" val="1"/>
+              <ma14:wrappingTextBoxFlag xmlns="" xmlns:ma14="http://schemas.microsoft.com/office/mac/drawingml/2011/main" val="1"/>
             </a:ext>
           </a:extLst>
         </p:spPr>
@@ -25396,7 +25435,7 @@
           </a:prstGeom>
           <a:extLst>
             <a:ext uri="{C572A759-6A51-4108-AA02-DFA0A04FC94B}">
-              <ma14:wrappingTextBoxFlag xmlns:ma14="http://schemas.microsoft.com/office/mac/drawingml/2011/main" xmlns="" val="1"/>
+              <ma14:wrappingTextBoxFlag xmlns="" xmlns:ma14="http://schemas.microsoft.com/office/mac/drawingml/2011/main" val="1"/>
             </a:ext>
           </a:extLst>
         </p:spPr>
@@ -25473,7 +25512,7 @@
           </a:prstGeom>
           <a:extLst>
             <a:ext uri="{C572A759-6A51-4108-AA02-DFA0A04FC94B}">
-              <ma14:wrappingTextBoxFlag xmlns:ma14="http://schemas.microsoft.com/office/mac/drawingml/2011/main" xmlns="" val="1"/>
+              <ma14:wrappingTextBoxFlag xmlns="" xmlns:ma14="http://schemas.microsoft.com/office/mac/drawingml/2011/main" val="1"/>
             </a:ext>
           </a:extLst>
         </p:spPr>
@@ -25991,7 +26030,7 @@
           </a:prstGeom>
           <a:extLst>
             <a:ext uri="{C572A759-6A51-4108-AA02-DFA0A04FC94B}">
-              <ma14:wrappingTextBoxFlag xmlns:ma14="http://schemas.microsoft.com/office/mac/drawingml/2011/main" xmlns="" val="1"/>
+              <ma14:wrappingTextBoxFlag xmlns="" xmlns:ma14="http://schemas.microsoft.com/office/mac/drawingml/2011/main" val="1"/>
             </a:ext>
           </a:extLst>
         </p:spPr>

</xml_diff>